<commit_message>
making small changes to test class and ppt
</commit_message>
<xml_diff>
--- a/Capstone_hdfc.pptx
+++ b/Capstone_hdfc.pptx
@@ -245,7 +245,7 @@
           <a:p>
             <a:fld id="{DBBD1C85-E1A4-447F-BAAD-9CEDE6E82C22}" type="datetimeFigureOut">
               <a:rPr lang="en-IN" smtClean="0"/>
-              <a:t>30-04-2023</a:t>
+              <a:t>01-05-2023</a:t>
             </a:fld>
             <a:endParaRPr lang="en-IN"/>
           </a:p>
@@ -662,7 +662,7 @@
           <a:p>
             <a:fld id="{6D3052E0-193B-4471-BAD0-B156ECCE0645}" type="datetimeFigureOut">
               <a:rPr lang="en-IN" smtClean="0"/>
-              <a:t>30-04-2023</a:t>
+              <a:t>01-05-2023</a:t>
             </a:fld>
             <a:endParaRPr lang="en-IN"/>
           </a:p>
@@ -865,7 +865,7 @@
           <a:p>
             <a:fld id="{6D3052E0-193B-4471-BAD0-B156ECCE0645}" type="datetimeFigureOut">
               <a:rPr lang="en-IN" smtClean="0"/>
-              <a:t>30-04-2023</a:t>
+              <a:t>01-05-2023</a:t>
             </a:fld>
             <a:endParaRPr lang="en-IN"/>
           </a:p>
@@ -1078,7 +1078,7 @@
           <a:p>
             <a:fld id="{6D3052E0-193B-4471-BAD0-B156ECCE0645}" type="datetimeFigureOut">
               <a:rPr lang="en-IN" smtClean="0"/>
-              <a:t>30-04-2023</a:t>
+              <a:t>01-05-2023</a:t>
             </a:fld>
             <a:endParaRPr lang="en-IN"/>
           </a:p>
@@ -1281,7 +1281,7 @@
           <a:p>
             <a:fld id="{6D3052E0-193B-4471-BAD0-B156ECCE0645}" type="datetimeFigureOut">
               <a:rPr lang="en-IN" smtClean="0"/>
-              <a:t>30-04-2023</a:t>
+              <a:t>01-05-2023</a:t>
             </a:fld>
             <a:endParaRPr lang="en-IN"/>
           </a:p>
@@ -1560,7 +1560,7 @@
           <a:p>
             <a:fld id="{6D3052E0-193B-4471-BAD0-B156ECCE0645}" type="datetimeFigureOut">
               <a:rPr lang="en-IN" smtClean="0"/>
-              <a:t>30-04-2023</a:t>
+              <a:t>01-05-2023</a:t>
             </a:fld>
             <a:endParaRPr lang="en-IN"/>
           </a:p>
@@ -1831,7 +1831,7 @@
           <a:p>
             <a:fld id="{6D3052E0-193B-4471-BAD0-B156ECCE0645}" type="datetimeFigureOut">
               <a:rPr lang="en-IN" smtClean="0"/>
-              <a:t>30-04-2023</a:t>
+              <a:t>01-05-2023</a:t>
             </a:fld>
             <a:endParaRPr lang="en-IN"/>
           </a:p>
@@ -2249,7 +2249,7 @@
           <a:p>
             <a:fld id="{6D3052E0-193B-4471-BAD0-B156ECCE0645}" type="datetimeFigureOut">
               <a:rPr lang="en-IN" smtClean="0"/>
-              <a:t>30-04-2023</a:t>
+              <a:t>01-05-2023</a:t>
             </a:fld>
             <a:endParaRPr lang="en-IN"/>
           </a:p>
@@ -2394,7 +2394,7 @@
           <a:p>
             <a:fld id="{6D3052E0-193B-4471-BAD0-B156ECCE0645}" type="datetimeFigureOut">
               <a:rPr lang="en-IN" smtClean="0"/>
-              <a:t>30-04-2023</a:t>
+              <a:t>01-05-2023</a:t>
             </a:fld>
             <a:endParaRPr lang="en-IN"/>
           </a:p>
@@ -2510,7 +2510,7 @@
           <a:p>
             <a:fld id="{6D3052E0-193B-4471-BAD0-B156ECCE0645}" type="datetimeFigureOut">
               <a:rPr lang="en-IN" smtClean="0"/>
-              <a:t>30-04-2023</a:t>
+              <a:t>01-05-2023</a:t>
             </a:fld>
             <a:endParaRPr lang="en-IN"/>
           </a:p>
@@ -2826,7 +2826,7 @@
           <a:p>
             <a:fld id="{6D3052E0-193B-4471-BAD0-B156ECCE0645}" type="datetimeFigureOut">
               <a:rPr lang="en-IN" smtClean="0"/>
-              <a:t>30-04-2023</a:t>
+              <a:t>01-05-2023</a:t>
             </a:fld>
             <a:endParaRPr lang="en-IN"/>
           </a:p>
@@ -3122,7 +3122,7 @@
           <a:p>
             <a:fld id="{6D3052E0-193B-4471-BAD0-B156ECCE0645}" type="datetimeFigureOut">
               <a:rPr lang="en-IN" smtClean="0"/>
-              <a:t>30-04-2023</a:t>
+              <a:t>01-05-2023</a:t>
             </a:fld>
             <a:endParaRPr lang="en-IN"/>
           </a:p>
@@ -3368,7 +3368,7 @@
           <a:p>
             <a:fld id="{6D3052E0-193B-4471-BAD0-B156ECCE0645}" type="datetimeFigureOut">
               <a:rPr lang="en-IN" smtClean="0"/>
-              <a:t>30-04-2023</a:t>
+              <a:t>01-05-2023</a:t>
             </a:fld>
             <a:endParaRPr lang="en-IN"/>
           </a:p>
@@ -5941,42 +5941,6 @@
           <a:chExt cx="0" cy="0"/>
         </a:xfrm>
       </p:grpSpPr>
-      <p:pic>
-        <p:nvPicPr>
-          <p:cNvPr id="4" name="Picture 3">
-            <a:extLst>
-              <a:ext uri="{FF2B5EF4-FFF2-40B4-BE49-F238E27FC236}">
-                <a16:creationId xmlns:a16="http://schemas.microsoft.com/office/drawing/2014/main" id="{3893C3C6-E6B4-0EAA-6168-B66B664B265B}"/>
-              </a:ext>
-            </a:extLst>
-          </p:cNvPr>
-          <p:cNvPicPr>
-            <a:picLocks noGrp="1" noRot="1" noChangeAspect="1" noMove="1" noResize="1" noEditPoints="1" noAdjustHandles="1" noChangeArrowheads="1" noChangeShapeType="1" noCrop="1"/>
-          </p:cNvPicPr>
-          <p:nvPr/>
-        </p:nvPicPr>
-        <p:blipFill>
-          <a:blip r:embed="rId2" cstate="email">
-            <a:extLst>
-              <a:ext uri="{28A0092B-C50C-407E-A947-70E740481C1C}">
-                <a14:useLocalDpi xmlns:a14="http://schemas.microsoft.com/office/drawing/2010/main"/>
-              </a:ext>
-            </a:extLst>
-          </a:blip>
-          <a:stretch>
-            <a:fillRect/>
-          </a:stretch>
-        </p:blipFill>
-        <p:spPr>
-          <a:xfrm flipH="1">
-            <a:off x="0" y="-20320"/>
-            <a:ext cx="12192000" cy="6858000"/>
-          </a:xfrm>
-          <a:prstGeom prst="rect">
-            <a:avLst/>
-          </a:prstGeom>
-        </p:spPr>
-      </p:pic>
       <p:cxnSp>
         <p:nvCxnSpPr>
           <p:cNvPr id="5" name="Straight Connector 4">
@@ -6035,7 +5999,7 @@
           <p:nvPr/>
         </p:nvPicPr>
         <p:blipFill>
-          <a:blip r:embed="rId3">
+          <a:blip r:embed="rId2">
             <a:extLst>
               <a:ext uri="{28A0092B-C50C-407E-A947-70E740481C1C}">
                 <a14:useLocalDpi xmlns:a14="http://schemas.microsoft.com/office/drawing/2010/main" val="0"/>
@@ -6138,7 +6102,7 @@
         </p:nvSpPr>
         <p:spPr>
           <a:xfrm>
-            <a:off x="406190" y="1158953"/>
+            <a:off x="406190" y="909352"/>
             <a:ext cx="10912049" cy="325474"/>
           </a:xfrm>
           <a:prstGeom prst="rect">
@@ -6240,7 +6204,7 @@
         </p:nvSpPr>
         <p:spPr>
           <a:xfrm>
-            <a:off x="2180970" y="1763310"/>
+            <a:off x="4738701" y="1214517"/>
             <a:ext cx="2714597" cy="369332"/>
           </a:xfrm>
           <a:prstGeom prst="rect">
@@ -6255,7 +6219,15 @@
           <a:lstStyle/>
           <a:p>
             <a:r>
-              <a:rPr lang="en-IN" dirty="0"/>
+              <a:rPr lang="en-IN" i="1" u="sng" dirty="0">
+                <a:effectLst>
+                  <a:outerShdw blurRad="38100" dist="38100" dir="2700000" algn="tl">
+                    <a:srgbClr val="000000">
+                      <a:alpha val="43137"/>
+                    </a:srgbClr>
+                  </a:outerShdw>
+                </a:effectLst>
+              </a:rPr>
               <a:t>EmployeeServiceTest Class</a:t>
             </a:r>
           </a:p>
@@ -6275,8 +6247,8 @@
         </p:nvSpPr>
         <p:spPr>
           <a:xfrm>
-            <a:off x="8948665" y="1740659"/>
-            <a:ext cx="1225850" cy="369332"/>
+            <a:off x="10269464" y="1738362"/>
+            <a:ext cx="1225850" cy="307777"/>
           </a:xfrm>
           <a:prstGeom prst="rect">
             <a:avLst/>
@@ -6290,18 +6262,50 @@
           <a:lstStyle/>
           <a:p>
             <a:r>
-              <a:rPr lang="en-IN" dirty="0"/>
-              <a:t>Test Result</a:t>
+              <a:rPr lang="en-IN" sz="1400" dirty="0">
+                <a:latin typeface="Bahnschrift" panose="020B0502040204020203" pitchFamily="34" charset="0"/>
+              </a:rPr>
+              <a:t>Test Results</a:t>
             </a:r>
           </a:p>
         </p:txBody>
       </p:sp>
       <p:pic>
         <p:nvPicPr>
-          <p:cNvPr id="14" name="Picture 13">
-            <a:extLst>
-              <a:ext uri="{FF2B5EF4-FFF2-40B4-BE49-F238E27FC236}">
-                <a16:creationId xmlns:a16="http://schemas.microsoft.com/office/drawing/2014/main" id="{45E923A8-565F-558D-8896-681BF15C5173}"/>
+          <p:cNvPr id="11" name="Picture 10">
+            <a:extLst>
+              <a:ext uri="{FF2B5EF4-FFF2-40B4-BE49-F238E27FC236}">
+                <a16:creationId xmlns:a16="http://schemas.microsoft.com/office/drawing/2014/main" id="{3600D2AB-3293-7A8C-BBC3-E578BA52C5DC}"/>
+              </a:ext>
+            </a:extLst>
+          </p:cNvPr>
+          <p:cNvPicPr>
+            <a:picLocks noChangeAspect="1"/>
+          </p:cNvPicPr>
+          <p:nvPr/>
+        </p:nvPicPr>
+        <p:blipFill>
+          <a:blip r:embed="rId3"/>
+          <a:stretch>
+            <a:fillRect/>
+          </a:stretch>
+        </p:blipFill>
+        <p:spPr>
+          <a:xfrm>
+            <a:off x="0" y="2046139"/>
+            <a:ext cx="4934857" cy="4791542"/>
+          </a:xfrm>
+          <a:prstGeom prst="rect">
+            <a:avLst/>
+          </a:prstGeom>
+        </p:spPr>
+      </p:pic>
+      <p:pic>
+        <p:nvPicPr>
+          <p:cNvPr id="18" name="Picture 17">
+            <a:extLst>
+              <a:ext uri="{FF2B5EF4-FFF2-40B4-BE49-F238E27FC236}">
+                <a16:creationId xmlns:a16="http://schemas.microsoft.com/office/drawing/2014/main" id="{CD261C3E-4191-C773-CE6D-5172CDF81599}"/>
               </a:ext>
             </a:extLst>
           </p:cNvPr>
@@ -6318,8 +6322,8 @@
         </p:blipFill>
         <p:spPr>
           <a:xfrm>
-            <a:off x="7296434" y="2063460"/>
-            <a:ext cx="4586723" cy="4636085"/>
+            <a:off x="4981656" y="2046139"/>
+            <a:ext cx="4188115" cy="4791542"/>
           </a:xfrm>
           <a:prstGeom prst="rect">
             <a:avLst/>
@@ -6328,10 +6332,10 @@
       </p:pic>
       <p:pic>
         <p:nvPicPr>
-          <p:cNvPr id="3" name="Picture 2">
-            <a:extLst>
-              <a:ext uri="{FF2B5EF4-FFF2-40B4-BE49-F238E27FC236}">
-                <a16:creationId xmlns:a16="http://schemas.microsoft.com/office/drawing/2014/main" id="{AF1C8373-461A-1F3A-C60D-3DB337167DE3}"/>
+          <p:cNvPr id="20" name="Picture 19">
+            <a:extLst>
+              <a:ext uri="{FF2B5EF4-FFF2-40B4-BE49-F238E27FC236}">
+                <a16:creationId xmlns:a16="http://schemas.microsoft.com/office/drawing/2014/main" id="{500A1F1A-9B27-348B-CABE-E229D7305D96}"/>
               </a:ext>
             </a:extLst>
           </p:cNvPr>
@@ -6348,14 +6352,88 @@
         </p:blipFill>
         <p:spPr>
           <a:xfrm>
-            <a:off x="308844" y="2063460"/>
-            <a:ext cx="6678748" cy="4636085"/>
+            <a:off x="9216571" y="2046139"/>
+            <a:ext cx="2975430" cy="4791542"/>
           </a:xfrm>
           <a:prstGeom prst="rect">
             <a:avLst/>
           </a:prstGeom>
         </p:spPr>
       </p:pic>
+      <p:sp>
+        <p:nvSpPr>
+          <p:cNvPr id="21" name="TextBox 20">
+            <a:extLst>
+              <a:ext uri="{FF2B5EF4-FFF2-40B4-BE49-F238E27FC236}">
+                <a16:creationId xmlns:a16="http://schemas.microsoft.com/office/drawing/2014/main" id="{0F077A12-D089-2DCD-164C-1CB4FCFDF715}"/>
+              </a:ext>
+            </a:extLst>
+          </p:cNvPr>
+          <p:cNvSpPr txBox="1"/>
+          <p:nvPr/>
+        </p:nvSpPr>
+        <p:spPr>
+          <a:xfrm>
+            <a:off x="1103086" y="1738362"/>
+            <a:ext cx="2322285" cy="307777"/>
+          </a:xfrm>
+          <a:prstGeom prst="rect">
+            <a:avLst/>
+          </a:prstGeom>
+          <a:noFill/>
+        </p:spPr>
+        <p:txBody>
+          <a:bodyPr wrap="square" rtlCol="0">
+            <a:spAutoFit/>
+          </a:bodyPr>
+          <a:lstStyle/>
+          <a:p>
+            <a:r>
+              <a:rPr lang="en-IN" sz="1400" dirty="0">
+                <a:latin typeface="Bahnschrift" panose="020B0502040204020203" pitchFamily="34" charset="0"/>
+              </a:rPr>
+              <a:t>Testing with mock object</a:t>
+            </a:r>
+          </a:p>
+        </p:txBody>
+      </p:sp>
+      <p:sp>
+        <p:nvSpPr>
+          <p:cNvPr id="24" name="TextBox 23">
+            <a:extLst>
+              <a:ext uri="{FF2B5EF4-FFF2-40B4-BE49-F238E27FC236}">
+                <a16:creationId xmlns:a16="http://schemas.microsoft.com/office/drawing/2014/main" id="{43701EEC-C4CC-AB8C-BD9F-D8F232F30877}"/>
+              </a:ext>
+            </a:extLst>
+          </p:cNvPr>
+          <p:cNvSpPr txBox="1"/>
+          <p:nvPr/>
+        </p:nvSpPr>
+        <p:spPr>
+          <a:xfrm>
+            <a:off x="6095999" y="1738362"/>
+            <a:ext cx="2075543" cy="307777"/>
+          </a:xfrm>
+          <a:prstGeom prst="rect">
+            <a:avLst/>
+          </a:prstGeom>
+          <a:noFill/>
+        </p:spPr>
+        <p:txBody>
+          <a:bodyPr wrap="square" rtlCol="0">
+            <a:spAutoFit/>
+          </a:bodyPr>
+          <a:lstStyle/>
+          <a:p>
+            <a:r>
+              <a:rPr lang="en-IN" sz="1400" dirty="0">
+                <a:latin typeface="Bahnschrift" panose="020B0502040204020203" pitchFamily="34" charset="0"/>
+              </a:rPr>
+              <a:t>Testing with real object</a:t>
+            </a:r>
+          </a:p>
+        </p:txBody>
+      </p:sp>
     </p:spTree>
     <p:extLst>
       <p:ext uri="{BB962C8B-B14F-4D97-AF65-F5344CB8AC3E}">

</xml_diff>